<commit_message>
Implementing build_boxplot() function in widgetPlotFigure module
</commit_message>
<xml_diff>
--- a/test_only/Template_Report_new.pptx
+++ b/test_only/Template_Report_new.pptx
@@ -3323,14 +3323,14 @@
       </p:grpSpPr>
       <p:pic>
         <p:nvPicPr>
-          <p:cNvPr id="2" name="Picture 1" descr="image.png"/>
+          <p:cNvPr id="2" name="Picture 1" descr="boxplot.png"/>
           <p:cNvPicPr>
             <a:picLocks noChangeAspect="1"/>
           </p:cNvPicPr>
           <p:nvPr/>
         </p:nvPicPr>
         <p:blipFill>
-          <a:blip r:embed="rId2"/>
+          <a:blip r:embed="rId3"/>
           <a:stretch>
             <a:fillRect/>
           </a:stretch>

</xml_diff>